<commit_message>
Update component and sequence diagrams
</commit_message>
<xml_diff>
--- a/docs/diagrams/ArchitectureDiagram.pptx
+++ b/docs/diagrams/ArchitectureDiagram.pptx
@@ -5,10 +5,11 @@
     <p:sldMasterId id="2147483648" r:id="rId1"/>
   </p:sldMasterIdLst>
   <p:notesMasterIdLst>
-    <p:notesMasterId r:id="rId3"/>
+    <p:notesMasterId r:id="rId4"/>
   </p:notesMasterIdLst>
   <p:sldIdLst>
     <p:sldId id="259" r:id="rId2"/>
+    <p:sldId id="261" r:id="rId3"/>
   </p:sldIdLst>
   <p:sldSz cx="9144000" cy="6858000" type="screen4x3"/>
   <p:notesSz cx="6858000" cy="9144000"/>
@@ -107,6 +108,22 @@
       </a:defRPr>
     </a:lvl9pPr>
   </p:defaultTextStyle>
+  <p:extLst>
+    <p:ext uri="{EFAFB233-063F-42B5-8137-9DF3F51BA10A}">
+      <p15:sldGuideLst xmlns:p15="http://schemas.microsoft.com/office/powerpoint/2012/main">
+        <p15:guide id="1" orient="horz" pos="1488">
+          <p15:clr>
+            <a:srgbClr val="A4A3A4"/>
+          </p15:clr>
+        </p15:guide>
+        <p15:guide id="2" pos="2880">
+          <p15:clr>
+            <a:srgbClr val="A4A3A4"/>
+          </p15:clr>
+        </p15:guide>
+      </p15:sldGuideLst>
+    </p:ext>
+  </p:extLst>
 </p:presentation>
 </file>
 
@@ -192,7 +209,7 @@
           <a:p>
             <a:fld id="{F5CC4B3F-88C1-4FFA-B1B6-F41C21DC6924}" type="datetimeFigureOut">
               <a:rPr lang="en-US" smtClean="0"/>
-              <a:t>10/16/2016</a:t>
+              <a:t>11/12/2018</a:t>
             </a:fld>
             <a:endParaRPr lang="en-US"/>
           </a:p>
@@ -256,38 +273,37 @@
           <a:p>
             <a:pPr lvl="0"/>
             <a:r>
-              <a:rPr lang="en-US" smtClean="0"/>
+              <a:rPr lang="en-US"/>
               <a:t>Click to edit Master text styles</a:t>
             </a:r>
           </a:p>
           <a:p>
             <a:pPr lvl="1"/>
             <a:r>
-              <a:rPr lang="en-US" smtClean="0"/>
+              <a:rPr lang="en-US"/>
               <a:t>Second level</a:t>
             </a:r>
           </a:p>
           <a:p>
             <a:pPr lvl="2"/>
             <a:r>
-              <a:rPr lang="en-US" smtClean="0"/>
+              <a:rPr lang="en-US"/>
               <a:t>Third level</a:t>
             </a:r>
           </a:p>
           <a:p>
             <a:pPr lvl="3"/>
             <a:r>
-              <a:rPr lang="en-US" smtClean="0"/>
+              <a:rPr lang="en-US"/>
               <a:t>Fourth level</a:t>
             </a:r>
           </a:p>
           <a:p>
             <a:pPr lvl="4"/>
             <a:r>
-              <a:rPr lang="en-US" smtClean="0"/>
+              <a:rPr lang="en-US"/>
               <a:t>Fifth level</a:t>
             </a:r>
-            <a:endParaRPr lang="en-US"/>
           </a:p>
         </p:txBody>
       </p:sp>
@@ -498,10 +514,9 @@
           <a:lstStyle/>
           <a:p>
             <a:r>
-              <a:rPr lang="en-US" smtClean="0"/>
+              <a:rPr lang="en-US"/>
               <a:t>Click to edit Master title style</a:t>
             </a:r>
-            <a:endParaRPr lang="en-US"/>
           </a:p>
         </p:txBody>
       </p:sp>
@@ -617,10 +632,9 @@
           </a:lstStyle>
           <a:p>
             <a:r>
-              <a:rPr lang="en-US" smtClean="0"/>
+              <a:rPr lang="en-US"/>
               <a:t>Click to edit Master subtitle style</a:t>
             </a:r>
-            <a:endParaRPr lang="en-US"/>
           </a:p>
         </p:txBody>
       </p:sp>
@@ -641,7 +655,7 @@
           <a:p>
             <a:fld id="{78C97017-6FC3-485B-9764-EAC9E56C1D49}" type="datetimeFigureOut">
               <a:rPr lang="en-US" smtClean="0"/>
-              <a:t>10/16/2016</a:t>
+              <a:t>11/12/2018</a:t>
             </a:fld>
             <a:endParaRPr lang="en-US"/>
           </a:p>
@@ -735,10 +749,9 @@
           <a:lstStyle/>
           <a:p>
             <a:r>
-              <a:rPr lang="en-US" smtClean="0"/>
+              <a:rPr lang="en-US"/>
               <a:t>Click to edit Master title style</a:t>
             </a:r>
-            <a:endParaRPr lang="en-US"/>
           </a:p>
         </p:txBody>
       </p:sp>
@@ -759,38 +772,37 @@
           <a:p>
             <a:pPr lvl="0"/>
             <a:r>
-              <a:rPr lang="en-US" smtClean="0"/>
+              <a:rPr lang="en-US"/>
               <a:t>Click to edit Master text styles</a:t>
             </a:r>
           </a:p>
           <a:p>
             <a:pPr lvl="1"/>
             <a:r>
-              <a:rPr lang="en-US" smtClean="0"/>
+              <a:rPr lang="en-US"/>
               <a:t>Second level</a:t>
             </a:r>
           </a:p>
           <a:p>
             <a:pPr lvl="2"/>
             <a:r>
-              <a:rPr lang="en-US" smtClean="0"/>
+              <a:rPr lang="en-US"/>
               <a:t>Third level</a:t>
             </a:r>
           </a:p>
           <a:p>
             <a:pPr lvl="3"/>
             <a:r>
-              <a:rPr lang="en-US" smtClean="0"/>
+              <a:rPr lang="en-US"/>
               <a:t>Fourth level</a:t>
             </a:r>
           </a:p>
           <a:p>
             <a:pPr lvl="4"/>
             <a:r>
-              <a:rPr lang="en-US" smtClean="0"/>
+              <a:rPr lang="en-US"/>
               <a:t>Fifth level</a:t>
             </a:r>
-            <a:endParaRPr lang="en-US"/>
           </a:p>
         </p:txBody>
       </p:sp>
@@ -811,7 +823,7 @@
           <a:p>
             <a:fld id="{78C97017-6FC3-485B-9764-EAC9E56C1D49}" type="datetimeFigureOut">
               <a:rPr lang="en-US" smtClean="0"/>
-              <a:t>10/16/2016</a:t>
+              <a:t>11/12/2018</a:t>
             </a:fld>
             <a:endParaRPr lang="en-US"/>
           </a:p>
@@ -910,10 +922,9 @@
           <a:lstStyle/>
           <a:p>
             <a:r>
-              <a:rPr lang="en-US" smtClean="0"/>
+              <a:rPr lang="en-US"/>
               <a:t>Click to edit Master title style</a:t>
             </a:r>
-            <a:endParaRPr lang="en-US"/>
           </a:p>
         </p:txBody>
       </p:sp>
@@ -939,38 +950,37 @@
           <a:p>
             <a:pPr lvl="0"/>
             <a:r>
-              <a:rPr lang="en-US" smtClean="0"/>
+              <a:rPr lang="en-US"/>
               <a:t>Click to edit Master text styles</a:t>
             </a:r>
           </a:p>
           <a:p>
             <a:pPr lvl="1"/>
             <a:r>
-              <a:rPr lang="en-US" smtClean="0"/>
+              <a:rPr lang="en-US"/>
               <a:t>Second level</a:t>
             </a:r>
           </a:p>
           <a:p>
             <a:pPr lvl="2"/>
             <a:r>
-              <a:rPr lang="en-US" smtClean="0"/>
+              <a:rPr lang="en-US"/>
               <a:t>Third level</a:t>
             </a:r>
           </a:p>
           <a:p>
             <a:pPr lvl="3"/>
             <a:r>
-              <a:rPr lang="en-US" smtClean="0"/>
+              <a:rPr lang="en-US"/>
               <a:t>Fourth level</a:t>
             </a:r>
           </a:p>
           <a:p>
             <a:pPr lvl="4"/>
             <a:r>
-              <a:rPr lang="en-US" smtClean="0"/>
+              <a:rPr lang="en-US"/>
               <a:t>Fifth level</a:t>
             </a:r>
-            <a:endParaRPr lang="en-US"/>
           </a:p>
         </p:txBody>
       </p:sp>
@@ -991,7 +1001,7 @@
           <a:p>
             <a:fld id="{78C97017-6FC3-485B-9764-EAC9E56C1D49}" type="datetimeFigureOut">
               <a:rPr lang="en-US" smtClean="0"/>
-              <a:t>10/16/2016</a:t>
+              <a:t>11/12/2018</a:t>
             </a:fld>
             <a:endParaRPr lang="en-US"/>
           </a:p>
@@ -1085,10 +1095,9 @@
           <a:lstStyle/>
           <a:p>
             <a:r>
-              <a:rPr lang="en-US" smtClean="0"/>
+              <a:rPr lang="en-US"/>
               <a:t>Click to edit Master title style</a:t>
             </a:r>
-            <a:endParaRPr lang="en-US"/>
           </a:p>
         </p:txBody>
       </p:sp>
@@ -1109,38 +1118,37 @@
           <a:p>
             <a:pPr lvl="0"/>
             <a:r>
-              <a:rPr lang="en-US" smtClean="0"/>
+              <a:rPr lang="en-US"/>
               <a:t>Click to edit Master text styles</a:t>
             </a:r>
           </a:p>
           <a:p>
             <a:pPr lvl="1"/>
             <a:r>
-              <a:rPr lang="en-US" smtClean="0"/>
+              <a:rPr lang="en-US"/>
               <a:t>Second level</a:t>
             </a:r>
           </a:p>
           <a:p>
             <a:pPr lvl="2"/>
             <a:r>
-              <a:rPr lang="en-US" smtClean="0"/>
+              <a:rPr lang="en-US"/>
               <a:t>Third level</a:t>
             </a:r>
           </a:p>
           <a:p>
             <a:pPr lvl="3"/>
             <a:r>
-              <a:rPr lang="en-US" smtClean="0"/>
+              <a:rPr lang="en-US"/>
               <a:t>Fourth level</a:t>
             </a:r>
           </a:p>
           <a:p>
             <a:pPr lvl="4"/>
             <a:r>
-              <a:rPr lang="en-US" smtClean="0"/>
+              <a:rPr lang="en-US"/>
               <a:t>Fifth level</a:t>
             </a:r>
-            <a:endParaRPr lang="en-US"/>
           </a:p>
         </p:txBody>
       </p:sp>
@@ -1161,7 +1169,7 @@
           <a:p>
             <a:fld id="{78C97017-6FC3-485B-9764-EAC9E56C1D49}" type="datetimeFigureOut">
               <a:rPr lang="en-US" smtClean="0"/>
-              <a:t>10/16/2016</a:t>
+              <a:t>11/12/2018</a:t>
             </a:fld>
             <a:endParaRPr lang="en-US"/>
           </a:p>
@@ -1264,10 +1272,9 @@
           </a:lstStyle>
           <a:p>
             <a:r>
-              <a:rPr lang="en-US" smtClean="0"/>
+              <a:rPr lang="en-US"/>
               <a:t>Click to edit Master title style</a:t>
             </a:r>
-            <a:endParaRPr lang="en-US"/>
           </a:p>
         </p:txBody>
       </p:sp>
@@ -1384,7 +1391,7 @@
           <a:p>
             <a:pPr lvl="0"/>
             <a:r>
-              <a:rPr lang="en-US" smtClean="0"/>
+              <a:rPr lang="en-US"/>
               <a:t>Click to edit Master text styles</a:t>
             </a:r>
           </a:p>
@@ -1407,7 +1414,7 @@
           <a:p>
             <a:fld id="{78C97017-6FC3-485B-9764-EAC9E56C1D49}" type="datetimeFigureOut">
               <a:rPr lang="en-US" smtClean="0"/>
-              <a:t>10/16/2016</a:t>
+              <a:t>11/12/2018</a:t>
             </a:fld>
             <a:endParaRPr lang="en-US"/>
           </a:p>
@@ -1501,10 +1508,9 @@
           <a:lstStyle/>
           <a:p>
             <a:r>
-              <a:rPr lang="en-US" smtClean="0"/>
+              <a:rPr lang="en-US"/>
               <a:t>Click to edit Master title style</a:t>
             </a:r>
-            <a:endParaRPr lang="en-US"/>
           </a:p>
         </p:txBody>
       </p:sp>
@@ -1558,38 +1564,37 @@
           <a:p>
             <a:pPr lvl="0"/>
             <a:r>
-              <a:rPr lang="en-US" smtClean="0"/>
+              <a:rPr lang="en-US"/>
               <a:t>Click to edit Master text styles</a:t>
             </a:r>
           </a:p>
           <a:p>
             <a:pPr lvl="1"/>
             <a:r>
-              <a:rPr lang="en-US" smtClean="0"/>
+              <a:rPr lang="en-US"/>
               <a:t>Second level</a:t>
             </a:r>
           </a:p>
           <a:p>
             <a:pPr lvl="2"/>
             <a:r>
-              <a:rPr lang="en-US" smtClean="0"/>
+              <a:rPr lang="en-US"/>
               <a:t>Third level</a:t>
             </a:r>
           </a:p>
           <a:p>
             <a:pPr lvl="3"/>
             <a:r>
-              <a:rPr lang="en-US" smtClean="0"/>
+              <a:rPr lang="en-US"/>
               <a:t>Fourth level</a:t>
             </a:r>
           </a:p>
           <a:p>
             <a:pPr lvl="4"/>
             <a:r>
-              <a:rPr lang="en-US" smtClean="0"/>
+              <a:rPr lang="en-US"/>
               <a:t>Fifth level</a:t>
             </a:r>
-            <a:endParaRPr lang="en-US"/>
           </a:p>
         </p:txBody>
       </p:sp>
@@ -1643,38 +1648,37 @@
           <a:p>
             <a:pPr lvl="0"/>
             <a:r>
-              <a:rPr lang="en-US" smtClean="0"/>
+              <a:rPr lang="en-US"/>
               <a:t>Click to edit Master text styles</a:t>
             </a:r>
           </a:p>
           <a:p>
             <a:pPr lvl="1"/>
             <a:r>
-              <a:rPr lang="en-US" smtClean="0"/>
+              <a:rPr lang="en-US"/>
               <a:t>Second level</a:t>
             </a:r>
           </a:p>
           <a:p>
             <a:pPr lvl="2"/>
             <a:r>
-              <a:rPr lang="en-US" smtClean="0"/>
+              <a:rPr lang="en-US"/>
               <a:t>Third level</a:t>
             </a:r>
           </a:p>
           <a:p>
             <a:pPr lvl="3"/>
             <a:r>
-              <a:rPr lang="en-US" smtClean="0"/>
+              <a:rPr lang="en-US"/>
               <a:t>Fourth level</a:t>
             </a:r>
           </a:p>
           <a:p>
             <a:pPr lvl="4"/>
             <a:r>
-              <a:rPr lang="en-US" smtClean="0"/>
+              <a:rPr lang="en-US"/>
               <a:t>Fifth level</a:t>
             </a:r>
-            <a:endParaRPr lang="en-US"/>
           </a:p>
         </p:txBody>
       </p:sp>
@@ -1695,7 +1699,7 @@
           <a:p>
             <a:fld id="{78C97017-6FC3-485B-9764-EAC9E56C1D49}" type="datetimeFigureOut">
               <a:rPr lang="en-US" smtClean="0"/>
-              <a:t>10/16/2016</a:t>
+              <a:t>11/12/2018</a:t>
             </a:fld>
             <a:endParaRPr lang="en-US"/>
           </a:p>
@@ -1793,10 +1797,9 @@
           </a:lstStyle>
           <a:p>
             <a:r>
-              <a:rPr lang="en-US" smtClean="0"/>
+              <a:rPr lang="en-US"/>
               <a:t>Click to edit Master title style</a:t>
             </a:r>
-            <a:endParaRPr lang="en-US"/>
           </a:p>
         </p:txBody>
       </p:sp>
@@ -1859,7 +1862,7 @@
           <a:p>
             <a:pPr lvl="0"/>
             <a:r>
-              <a:rPr lang="en-US" smtClean="0"/>
+              <a:rPr lang="en-US"/>
               <a:t>Click to edit Master text styles</a:t>
             </a:r>
           </a:p>
@@ -1915,38 +1918,37 @@
           <a:p>
             <a:pPr lvl="0"/>
             <a:r>
-              <a:rPr lang="en-US" smtClean="0"/>
+              <a:rPr lang="en-US"/>
               <a:t>Click to edit Master text styles</a:t>
             </a:r>
           </a:p>
           <a:p>
             <a:pPr lvl="1"/>
             <a:r>
-              <a:rPr lang="en-US" smtClean="0"/>
+              <a:rPr lang="en-US"/>
               <a:t>Second level</a:t>
             </a:r>
           </a:p>
           <a:p>
             <a:pPr lvl="2"/>
             <a:r>
-              <a:rPr lang="en-US" smtClean="0"/>
+              <a:rPr lang="en-US"/>
               <a:t>Third level</a:t>
             </a:r>
           </a:p>
           <a:p>
             <a:pPr lvl="3"/>
             <a:r>
-              <a:rPr lang="en-US" smtClean="0"/>
+              <a:rPr lang="en-US"/>
               <a:t>Fourth level</a:t>
             </a:r>
           </a:p>
           <a:p>
             <a:pPr lvl="4"/>
             <a:r>
-              <a:rPr lang="en-US" smtClean="0"/>
+              <a:rPr lang="en-US"/>
               <a:t>Fifth level</a:t>
             </a:r>
-            <a:endParaRPr lang="en-US"/>
           </a:p>
         </p:txBody>
       </p:sp>
@@ -2009,7 +2011,7 @@
           <a:p>
             <a:pPr lvl="0"/>
             <a:r>
-              <a:rPr lang="en-US" smtClean="0"/>
+              <a:rPr lang="en-US"/>
               <a:t>Click to edit Master text styles</a:t>
             </a:r>
           </a:p>
@@ -2065,38 +2067,37 @@
           <a:p>
             <a:pPr lvl="0"/>
             <a:r>
-              <a:rPr lang="en-US" smtClean="0"/>
+              <a:rPr lang="en-US"/>
               <a:t>Click to edit Master text styles</a:t>
             </a:r>
           </a:p>
           <a:p>
             <a:pPr lvl="1"/>
             <a:r>
-              <a:rPr lang="en-US" smtClean="0"/>
+              <a:rPr lang="en-US"/>
               <a:t>Second level</a:t>
             </a:r>
           </a:p>
           <a:p>
             <a:pPr lvl="2"/>
             <a:r>
-              <a:rPr lang="en-US" smtClean="0"/>
+              <a:rPr lang="en-US"/>
               <a:t>Third level</a:t>
             </a:r>
           </a:p>
           <a:p>
             <a:pPr lvl="3"/>
             <a:r>
-              <a:rPr lang="en-US" smtClean="0"/>
+              <a:rPr lang="en-US"/>
               <a:t>Fourth level</a:t>
             </a:r>
           </a:p>
           <a:p>
             <a:pPr lvl="4"/>
             <a:r>
-              <a:rPr lang="en-US" smtClean="0"/>
+              <a:rPr lang="en-US"/>
               <a:t>Fifth level</a:t>
             </a:r>
-            <a:endParaRPr lang="en-US"/>
           </a:p>
         </p:txBody>
       </p:sp>
@@ -2117,7 +2118,7 @@
           <a:p>
             <a:fld id="{78C97017-6FC3-485B-9764-EAC9E56C1D49}" type="datetimeFigureOut">
               <a:rPr lang="en-US" smtClean="0"/>
-              <a:t>10/16/2016</a:t>
+              <a:t>11/12/2018</a:t>
             </a:fld>
             <a:endParaRPr lang="en-US"/>
           </a:p>
@@ -2211,10 +2212,9 @@
           <a:lstStyle/>
           <a:p>
             <a:r>
-              <a:rPr lang="en-US" smtClean="0"/>
+              <a:rPr lang="en-US"/>
               <a:t>Click to edit Master title style</a:t>
             </a:r>
-            <a:endParaRPr lang="en-US"/>
           </a:p>
         </p:txBody>
       </p:sp>
@@ -2235,7 +2235,7 @@
           <a:p>
             <a:fld id="{78C97017-6FC3-485B-9764-EAC9E56C1D49}" type="datetimeFigureOut">
               <a:rPr lang="en-US" smtClean="0"/>
-              <a:t>10/16/2016</a:t>
+              <a:t>11/12/2018</a:t>
             </a:fld>
             <a:endParaRPr lang="en-US"/>
           </a:p>
@@ -2330,7 +2330,7 @@
           <a:p>
             <a:fld id="{78C97017-6FC3-485B-9764-EAC9E56C1D49}" type="datetimeFigureOut">
               <a:rPr lang="en-US" smtClean="0"/>
-              <a:t>10/16/2016</a:t>
+              <a:t>11/12/2018</a:t>
             </a:fld>
             <a:endParaRPr lang="en-US"/>
           </a:p>
@@ -2433,10 +2433,9 @@
           </a:lstStyle>
           <a:p>
             <a:r>
-              <a:rPr lang="en-US" smtClean="0"/>
+              <a:rPr lang="en-US"/>
               <a:t>Click to edit Master title style</a:t>
             </a:r>
-            <a:endParaRPr lang="en-US"/>
           </a:p>
         </p:txBody>
       </p:sp>
@@ -2490,38 +2489,37 @@
           <a:p>
             <a:pPr lvl="0"/>
             <a:r>
-              <a:rPr lang="en-US" smtClean="0"/>
+              <a:rPr lang="en-US"/>
               <a:t>Click to edit Master text styles</a:t>
             </a:r>
           </a:p>
           <a:p>
             <a:pPr lvl="1"/>
             <a:r>
-              <a:rPr lang="en-US" smtClean="0"/>
+              <a:rPr lang="en-US"/>
               <a:t>Second level</a:t>
             </a:r>
           </a:p>
           <a:p>
             <a:pPr lvl="2"/>
             <a:r>
-              <a:rPr lang="en-US" smtClean="0"/>
+              <a:rPr lang="en-US"/>
               <a:t>Third level</a:t>
             </a:r>
           </a:p>
           <a:p>
             <a:pPr lvl="3"/>
             <a:r>
-              <a:rPr lang="en-US" smtClean="0"/>
+              <a:rPr lang="en-US"/>
               <a:t>Fourth level</a:t>
             </a:r>
           </a:p>
           <a:p>
             <a:pPr lvl="4"/>
             <a:r>
-              <a:rPr lang="en-US" smtClean="0"/>
+              <a:rPr lang="en-US"/>
               <a:t>Fifth level</a:t>
             </a:r>
-            <a:endParaRPr lang="en-US"/>
           </a:p>
         </p:txBody>
       </p:sp>
@@ -2584,7 +2582,7 @@
           <a:p>
             <a:pPr lvl="0"/>
             <a:r>
-              <a:rPr lang="en-US" smtClean="0"/>
+              <a:rPr lang="en-US"/>
               <a:t>Click to edit Master text styles</a:t>
             </a:r>
           </a:p>
@@ -2607,7 +2605,7 @@
           <a:p>
             <a:fld id="{78C97017-6FC3-485B-9764-EAC9E56C1D49}" type="datetimeFigureOut">
               <a:rPr lang="en-US" smtClean="0"/>
-              <a:t>10/16/2016</a:t>
+              <a:t>11/12/2018</a:t>
             </a:fld>
             <a:endParaRPr lang="en-US"/>
           </a:p>
@@ -2710,10 +2708,9 @@
           </a:lstStyle>
           <a:p>
             <a:r>
-              <a:rPr lang="en-US" smtClean="0"/>
+              <a:rPr lang="en-US"/>
               <a:t>Click to edit Master title style</a:t>
             </a:r>
-            <a:endParaRPr lang="en-US"/>
           </a:p>
         </p:txBody>
       </p:sp>
@@ -2837,7 +2834,7 @@
           <a:p>
             <a:pPr lvl="0"/>
             <a:r>
-              <a:rPr lang="en-US" smtClean="0"/>
+              <a:rPr lang="en-US"/>
               <a:t>Click to edit Master text styles</a:t>
             </a:r>
           </a:p>
@@ -2860,7 +2857,7 @@
           <a:p>
             <a:fld id="{78C97017-6FC3-485B-9764-EAC9E56C1D49}" type="datetimeFigureOut">
               <a:rPr lang="en-US" smtClean="0"/>
-              <a:t>10/16/2016</a:t>
+              <a:t>11/12/2018</a:t>
             </a:fld>
             <a:endParaRPr lang="en-US"/>
           </a:p>
@@ -2969,10 +2966,9 @@
           <a:lstStyle/>
           <a:p>
             <a:r>
-              <a:rPr lang="en-US" smtClean="0"/>
+              <a:rPr lang="en-US"/>
               <a:t>Click to edit Master title style</a:t>
             </a:r>
-            <a:endParaRPr lang="en-US"/>
           </a:p>
         </p:txBody>
       </p:sp>
@@ -3003,38 +2999,37 @@
           <a:p>
             <a:pPr lvl="0"/>
             <a:r>
-              <a:rPr lang="en-US" smtClean="0"/>
+              <a:rPr lang="en-US"/>
               <a:t>Click to edit Master text styles</a:t>
             </a:r>
           </a:p>
           <a:p>
             <a:pPr lvl="1"/>
             <a:r>
-              <a:rPr lang="en-US" smtClean="0"/>
+              <a:rPr lang="en-US"/>
               <a:t>Second level</a:t>
             </a:r>
           </a:p>
           <a:p>
             <a:pPr lvl="2"/>
             <a:r>
-              <a:rPr lang="en-US" smtClean="0"/>
+              <a:rPr lang="en-US"/>
               <a:t>Third level</a:t>
             </a:r>
           </a:p>
           <a:p>
             <a:pPr lvl="3"/>
             <a:r>
-              <a:rPr lang="en-US" smtClean="0"/>
+              <a:rPr lang="en-US"/>
               <a:t>Fourth level</a:t>
             </a:r>
           </a:p>
           <a:p>
             <a:pPr lvl="4"/>
             <a:r>
-              <a:rPr lang="en-US" smtClean="0"/>
+              <a:rPr lang="en-US"/>
               <a:t>Fifth level</a:t>
             </a:r>
-            <a:endParaRPr lang="en-US"/>
           </a:p>
         </p:txBody>
       </p:sp>
@@ -3073,7 +3068,7 @@
           <a:p>
             <a:fld id="{78C97017-6FC3-485B-9764-EAC9E56C1D49}" type="datetimeFigureOut">
               <a:rPr lang="en-US" smtClean="0"/>
-              <a:t>10/16/2016</a:t>
+              <a:t>11/12/2018</a:t>
             </a:fld>
             <a:endParaRPr lang="en-US"/>
           </a:p>
@@ -3546,7 +3541,7 @@
           <a:p>
             <a:pPr algn="ctr"/>
             <a:r>
-              <a:rPr lang="en-US" sz="1600" dirty="0" smtClean="0">
+              <a:rPr lang="en-US" sz="1600" dirty="0">
                 <a:solidFill>
                   <a:schemeClr val="bg1"/>
                 </a:solidFill>
@@ -3605,7 +3600,7 @@
           <a:p>
             <a:pPr algn="ctr"/>
             <a:r>
-              <a:rPr lang="en-US" sz="1600" dirty="0" smtClean="0">
+              <a:rPr lang="en-US" sz="1600" dirty="0">
                 <a:solidFill>
                   <a:schemeClr val="bg1"/>
                 </a:solidFill>
@@ -3668,7 +3663,7 @@
           <a:p>
             <a:pPr algn="ctr"/>
             <a:r>
-              <a:rPr lang="en-US" sz="1600" dirty="0" smtClean="0">
+              <a:rPr lang="en-US" sz="1600" dirty="0">
                 <a:solidFill>
                   <a:schemeClr val="bg1"/>
                 </a:solidFill>
@@ -3727,7 +3722,7 @@
           <a:p>
             <a:pPr algn="ctr"/>
             <a:r>
-              <a:rPr lang="en-US" sz="1600" dirty="0" smtClean="0">
+              <a:rPr lang="en-US" sz="1600" dirty="0">
                 <a:solidFill>
                   <a:schemeClr val="bg1"/>
                 </a:solidFill>
@@ -4233,6 +4228,7 @@
         <p:nvCxnSpPr>
           <p:cNvPr id="52" name="Elbow Connector 51"/>
           <p:cNvCxnSpPr>
+            <a:cxnSpLocks/>
             <a:stCxn id="2" idx="0"/>
             <a:endCxn id="51" idx="2"/>
           </p:cNvCxnSpPr>
@@ -4313,7 +4309,7 @@
           <a:p>
             <a:pPr algn="ctr"/>
             <a:r>
-              <a:rPr lang="en-US" sz="1600" dirty="0" smtClean="0">
+              <a:rPr lang="en-US" sz="1600" dirty="0">
                 <a:solidFill>
                   <a:schemeClr val="bg1"/>
                 </a:solidFill>
@@ -4664,7 +4660,7 @@
           <a:p>
             <a:pPr algn="ctr"/>
             <a:r>
-              <a:rPr lang="en-US" sz="1600" dirty="0" smtClean="0">
+              <a:rPr lang="en-US" sz="1600" dirty="0">
                 <a:solidFill>
                   <a:schemeClr val="bg1"/>
                 </a:solidFill>
@@ -4672,25 +4668,20 @@
               <a:t>Logs</a:t>
             </a:r>
             <a:br>
-              <a:rPr lang="en-US" sz="1600" dirty="0" smtClean="0">
+              <a:rPr lang="en-US" sz="1600" dirty="0">
                 <a:solidFill>
                   <a:schemeClr val="bg1"/>
                 </a:solidFill>
               </a:rPr>
             </a:br>
             <a:r>
-              <a:rPr lang="en-US" sz="1600" dirty="0" smtClean="0">
+              <a:rPr lang="en-US" sz="1600" dirty="0">
                 <a:solidFill>
                   <a:schemeClr val="bg1"/>
                 </a:solidFill>
               </a:rPr>
               <a:t>Center</a:t>
             </a:r>
-            <a:endParaRPr lang="en-US" sz="1600" dirty="0">
-              <a:solidFill>
-                <a:schemeClr val="bg1"/>
-              </a:solidFill>
-            </a:endParaRPr>
           </a:p>
         </p:txBody>
       </p:sp>
@@ -4777,6 +4768,1261 @@
     <p:extLst>
       <p:ext uri="{BB962C8B-B14F-4D97-AF65-F5344CB8AC3E}">
         <p14:creationId xmlns:p14="http://schemas.microsoft.com/office/powerpoint/2010/main" val="1981432603"/>
+      </p:ext>
+    </p:extLst>
+  </p:cSld>
+  <p:clrMapOvr>
+    <a:masterClrMapping/>
+  </p:clrMapOvr>
+</p:sld>
+</file>
+
+<file path=ppt/slides/slide2.xml><?xml version="1.0" encoding="utf-8"?>
+<p:sld xmlns:a="http://schemas.openxmlformats.org/drawingml/2006/main" xmlns:r="http://schemas.openxmlformats.org/officeDocument/2006/relationships" xmlns:p="http://schemas.openxmlformats.org/presentationml/2006/main">
+  <p:cSld>
+    <p:spTree>
+      <p:nvGrpSpPr>
+        <p:cNvPr id="1" name=""/>
+        <p:cNvGrpSpPr/>
+        <p:nvPr/>
+      </p:nvGrpSpPr>
+      <p:grpSpPr>
+        <a:xfrm>
+          <a:off x="0" y="0"/>
+          <a:ext cx="0" cy="0"/>
+          <a:chOff x="0" y="0"/>
+          <a:chExt cx="0" cy="0"/>
+        </a:xfrm>
+      </p:grpSpPr>
+      <p:sp>
+        <p:nvSpPr>
+          <p:cNvPr id="15" name="Rounded Rectangle 14"/>
+          <p:cNvSpPr/>
+          <p:nvPr/>
+        </p:nvSpPr>
+        <p:spPr>
+          <a:xfrm>
+            <a:off x="1636188" y="2057400"/>
+            <a:ext cx="5700181" cy="2667000"/>
+          </a:xfrm>
+          <a:prstGeom prst="roundRect">
+            <a:avLst>
+              <a:gd name="adj" fmla="val 5768"/>
+            </a:avLst>
+          </a:prstGeom>
+          <a:solidFill>
+            <a:schemeClr val="bg1">
+              <a:lumMod val="95000"/>
+            </a:schemeClr>
+          </a:solidFill>
+          <a:ln>
+            <a:solidFill>
+              <a:schemeClr val="bg1">
+                <a:lumMod val="85000"/>
+              </a:schemeClr>
+            </a:solidFill>
+          </a:ln>
+        </p:spPr>
+        <p:style>
+          <a:lnRef idx="2">
+            <a:schemeClr val="accent1">
+              <a:shade val="50000"/>
+            </a:schemeClr>
+          </a:lnRef>
+          <a:fillRef idx="1">
+            <a:schemeClr val="accent1"/>
+          </a:fillRef>
+          <a:effectRef idx="0">
+            <a:schemeClr val="accent1"/>
+          </a:effectRef>
+          <a:fontRef idx="minor">
+            <a:schemeClr val="lt1"/>
+          </a:fontRef>
+        </p:style>
+        <p:txBody>
+          <a:bodyPr rtlCol="0" anchor="ctr"/>
+          <a:lstStyle/>
+          <a:p>
+            <a:pPr algn="ctr"/>
+            <a:endParaRPr lang="en-US"/>
+          </a:p>
+        </p:txBody>
+      </p:sp>
+      <p:sp>
+        <p:nvSpPr>
+          <p:cNvPr id="2" name="Rectangle 62"/>
+          <p:cNvSpPr/>
+          <p:nvPr/>
+        </p:nvSpPr>
+        <p:spPr>
+          <a:xfrm flipH="1">
+            <a:off x="1964269" y="2191178"/>
+            <a:ext cx="609602" cy="1294917"/>
+          </a:xfrm>
+          <a:prstGeom prst="roundRect">
+            <a:avLst/>
+          </a:prstGeom>
+          <a:solidFill>
+            <a:srgbClr val="00B050"/>
+          </a:solidFill>
+          <a:ln w="19050">
+            <a:solidFill>
+              <a:srgbClr val="00B050"/>
+            </a:solidFill>
+          </a:ln>
+          <a:effectLst/>
+        </p:spPr>
+        <p:style>
+          <a:lnRef idx="1">
+            <a:schemeClr val="accent2"/>
+          </a:lnRef>
+          <a:fillRef idx="2">
+            <a:schemeClr val="accent2"/>
+          </a:fillRef>
+          <a:effectRef idx="1">
+            <a:schemeClr val="accent2"/>
+          </a:effectRef>
+          <a:fontRef idx="minor">
+            <a:schemeClr val="dk1"/>
+          </a:fontRef>
+        </p:style>
+        <p:txBody>
+          <a:bodyPr rtlCol="0" anchor="ctr"/>
+          <a:lstStyle/>
+          <a:p>
+            <a:pPr algn="ctr"/>
+            <a:r>
+              <a:rPr lang="en-US" sz="1600" dirty="0">
+                <a:solidFill>
+                  <a:schemeClr val="bg1"/>
+                </a:solidFill>
+              </a:rPr>
+              <a:t>UI</a:t>
+            </a:r>
+            <a:endParaRPr lang="en-SG" sz="1600" dirty="0">
+              <a:solidFill>
+                <a:schemeClr val="bg1"/>
+              </a:solidFill>
+            </a:endParaRPr>
+          </a:p>
+        </p:txBody>
+      </p:sp>
+      <p:sp>
+        <p:nvSpPr>
+          <p:cNvPr id="3" name="Rectangle 45"/>
+          <p:cNvSpPr/>
+          <p:nvPr/>
+        </p:nvSpPr>
+        <p:spPr>
+          <a:xfrm>
+            <a:off x="3412069" y="2191178"/>
+            <a:ext cx="1295400" cy="552022"/>
+          </a:xfrm>
+          <a:prstGeom prst="roundRect">
+            <a:avLst/>
+          </a:prstGeom>
+          <a:solidFill>
+            <a:srgbClr val="0070C0"/>
+          </a:solidFill>
+          <a:ln w="19050">
+            <a:solidFill>
+              <a:srgbClr val="0070C0"/>
+            </a:solidFill>
+          </a:ln>
+          <a:effectLst/>
+        </p:spPr>
+        <p:style>
+          <a:lnRef idx="1">
+            <a:schemeClr val="accent5"/>
+          </a:lnRef>
+          <a:fillRef idx="2">
+            <a:schemeClr val="accent5"/>
+          </a:fillRef>
+          <a:effectRef idx="1">
+            <a:schemeClr val="accent5"/>
+          </a:effectRef>
+          <a:fontRef idx="minor">
+            <a:schemeClr val="dk1"/>
+          </a:fontRef>
+        </p:style>
+        <p:txBody>
+          <a:bodyPr rtlCol="0" anchor="ctr"/>
+          <a:lstStyle/>
+          <a:p>
+            <a:pPr algn="ctr"/>
+            <a:r>
+              <a:rPr lang="en-US" sz="1600" dirty="0">
+                <a:solidFill>
+                  <a:schemeClr val="bg1"/>
+                </a:solidFill>
+              </a:rPr>
+              <a:t>Logic</a:t>
+            </a:r>
+            <a:endParaRPr lang="en-SG" sz="1600" dirty="0">
+              <a:solidFill>
+                <a:schemeClr val="bg1"/>
+              </a:solidFill>
+            </a:endParaRPr>
+          </a:p>
+        </p:txBody>
+      </p:sp>
+      <p:sp>
+        <p:nvSpPr>
+          <p:cNvPr id="4" name="Rectangle 45"/>
+          <p:cNvSpPr/>
+          <p:nvPr/>
+        </p:nvSpPr>
+        <p:spPr>
+          <a:xfrm>
+            <a:off x="5164669" y="2191179"/>
+            <a:ext cx="1447800" cy="552022"/>
+          </a:xfrm>
+          <a:prstGeom prst="roundRect">
+            <a:avLst/>
+          </a:prstGeom>
+          <a:solidFill>
+            <a:schemeClr val="accent6">
+              <a:lumMod val="75000"/>
+            </a:schemeClr>
+          </a:solidFill>
+          <a:ln w="19050">
+            <a:solidFill>
+              <a:schemeClr val="accent6">
+                <a:lumMod val="75000"/>
+              </a:schemeClr>
+            </a:solidFill>
+          </a:ln>
+          <a:effectLst/>
+        </p:spPr>
+        <p:style>
+          <a:lnRef idx="1">
+            <a:schemeClr val="accent5"/>
+          </a:lnRef>
+          <a:fillRef idx="2">
+            <a:schemeClr val="accent5"/>
+          </a:fillRef>
+          <a:effectRef idx="1">
+            <a:schemeClr val="accent5"/>
+          </a:effectRef>
+          <a:fontRef idx="minor">
+            <a:schemeClr val="dk1"/>
+          </a:fontRef>
+        </p:style>
+        <p:txBody>
+          <a:bodyPr rtlCol="0" anchor="ctr"/>
+          <a:lstStyle/>
+          <a:p>
+            <a:pPr algn="ctr"/>
+            <a:r>
+              <a:rPr lang="en-US" sz="1600" dirty="0">
+                <a:solidFill>
+                  <a:schemeClr val="bg1"/>
+                </a:solidFill>
+              </a:rPr>
+              <a:t>Storage</a:t>
+            </a:r>
+            <a:endParaRPr lang="en-SG" sz="1600" dirty="0">
+              <a:solidFill>
+                <a:schemeClr val="bg1"/>
+              </a:solidFill>
+            </a:endParaRPr>
+          </a:p>
+        </p:txBody>
+      </p:sp>
+      <p:sp>
+        <p:nvSpPr>
+          <p:cNvPr id="5" name="Rectangle 45"/>
+          <p:cNvSpPr/>
+          <p:nvPr/>
+        </p:nvSpPr>
+        <p:spPr>
+          <a:xfrm>
+            <a:off x="3412069" y="3124200"/>
+            <a:ext cx="1295400" cy="723791"/>
+          </a:xfrm>
+          <a:prstGeom prst="roundRect">
+            <a:avLst/>
+          </a:prstGeom>
+          <a:solidFill>
+            <a:srgbClr val="7030A0"/>
+          </a:solidFill>
+          <a:ln w="19050">
+            <a:solidFill>
+              <a:srgbClr val="7030A0"/>
+            </a:solidFill>
+          </a:ln>
+          <a:effectLst/>
+        </p:spPr>
+        <p:style>
+          <a:lnRef idx="1">
+            <a:schemeClr val="accent5"/>
+          </a:lnRef>
+          <a:fillRef idx="2">
+            <a:schemeClr val="accent5"/>
+          </a:fillRef>
+          <a:effectRef idx="1">
+            <a:schemeClr val="accent5"/>
+          </a:effectRef>
+          <a:fontRef idx="minor">
+            <a:schemeClr val="dk1"/>
+          </a:fontRef>
+        </p:style>
+        <p:txBody>
+          <a:bodyPr rtlCol="0" anchor="ctr"/>
+          <a:lstStyle/>
+          <a:p>
+            <a:pPr algn="ctr"/>
+            <a:r>
+              <a:rPr lang="en-US" sz="1600" dirty="0">
+                <a:solidFill>
+                  <a:schemeClr val="bg1"/>
+                </a:solidFill>
+              </a:rPr>
+              <a:t>Model</a:t>
+            </a:r>
+            <a:endParaRPr lang="en-SG" sz="1600" dirty="0">
+              <a:solidFill>
+                <a:schemeClr val="bg1"/>
+              </a:solidFill>
+            </a:endParaRPr>
+          </a:p>
+        </p:txBody>
+      </p:sp>
+      <p:sp>
+        <p:nvSpPr>
+          <p:cNvPr id="8" name="Rectangle 45"/>
+          <p:cNvSpPr/>
+          <p:nvPr/>
+        </p:nvSpPr>
+        <p:spPr>
+          <a:xfrm>
+            <a:off x="3217846" y="4131994"/>
+            <a:ext cx="2658531" cy="444640"/>
+          </a:xfrm>
+          <a:prstGeom prst="roundRect">
+            <a:avLst/>
+          </a:prstGeom>
+          <a:solidFill>
+            <a:schemeClr val="accent5">
+              <a:lumMod val="75000"/>
+            </a:schemeClr>
+          </a:solidFill>
+          <a:ln w="19050">
+            <a:solidFill>
+              <a:schemeClr val="accent5">
+                <a:lumMod val="75000"/>
+              </a:schemeClr>
+            </a:solidFill>
+          </a:ln>
+          <a:effectLst/>
+        </p:spPr>
+        <p:style>
+          <a:lnRef idx="1">
+            <a:schemeClr val="accent5"/>
+          </a:lnRef>
+          <a:fillRef idx="2">
+            <a:schemeClr val="accent5"/>
+          </a:fillRef>
+          <a:effectRef idx="1">
+            <a:schemeClr val="accent5"/>
+          </a:effectRef>
+          <a:fontRef idx="minor">
+            <a:schemeClr val="dk1"/>
+          </a:fontRef>
+        </p:style>
+        <p:txBody>
+          <a:bodyPr rtlCol="0" anchor="ctr"/>
+          <a:lstStyle/>
+          <a:p>
+            <a:pPr algn="ctr"/>
+            <a:r>
+              <a:rPr lang="en-US" sz="1400" dirty="0">
+                <a:solidFill>
+                  <a:schemeClr val="bg1"/>
+                </a:solidFill>
+              </a:rPr>
+              <a:t>Commons</a:t>
+            </a:r>
+            <a:endParaRPr lang="en-SG" sz="1400" dirty="0">
+              <a:solidFill>
+                <a:schemeClr val="bg1"/>
+              </a:solidFill>
+            </a:endParaRPr>
+          </a:p>
+        </p:txBody>
+      </p:sp>
+      <p:cxnSp>
+        <p:nvCxnSpPr>
+          <p:cNvPr id="10" name="Straight Arrow Connector 9"/>
+          <p:cNvCxnSpPr>
+            <a:endCxn id="3" idx="1"/>
+          </p:cNvCxnSpPr>
+          <p:nvPr/>
+        </p:nvCxnSpPr>
+        <p:spPr>
+          <a:xfrm>
+            <a:off x="2573871" y="2467189"/>
+            <a:ext cx="838198" cy="0"/>
+          </a:xfrm>
+          <a:prstGeom prst="straightConnector1">
+            <a:avLst/>
+          </a:prstGeom>
+          <a:ln w="28575">
+            <a:solidFill>
+              <a:srgbClr val="00B050"/>
+            </a:solidFill>
+            <a:tailEnd type="arrow"/>
+          </a:ln>
+        </p:spPr>
+        <p:style>
+          <a:lnRef idx="1">
+            <a:schemeClr val="accent1"/>
+          </a:lnRef>
+          <a:fillRef idx="0">
+            <a:schemeClr val="accent1"/>
+          </a:fillRef>
+          <a:effectRef idx="0">
+            <a:schemeClr val="accent1"/>
+          </a:effectRef>
+          <a:fontRef idx="minor">
+            <a:schemeClr val="tx1"/>
+          </a:fontRef>
+        </p:style>
+      </p:cxnSp>
+      <p:cxnSp>
+        <p:nvCxnSpPr>
+          <p:cNvPr id="12" name="Straight Arrow Connector 11"/>
+          <p:cNvCxnSpPr/>
+          <p:nvPr/>
+        </p:nvCxnSpPr>
+        <p:spPr>
+          <a:xfrm>
+            <a:off x="2569639" y="3276600"/>
+            <a:ext cx="838198" cy="0"/>
+          </a:xfrm>
+          <a:prstGeom prst="straightConnector1">
+            <a:avLst/>
+          </a:prstGeom>
+          <a:ln w="28575">
+            <a:solidFill>
+              <a:srgbClr val="00B050"/>
+            </a:solidFill>
+            <a:tailEnd type="arrow"/>
+          </a:ln>
+        </p:spPr>
+        <p:style>
+          <a:lnRef idx="1">
+            <a:schemeClr val="accent1"/>
+          </a:lnRef>
+          <a:fillRef idx="0">
+            <a:schemeClr val="accent1"/>
+          </a:fillRef>
+          <a:effectRef idx="0">
+            <a:schemeClr val="accent1"/>
+          </a:effectRef>
+          <a:fontRef idx="minor">
+            <a:schemeClr val="tx1"/>
+          </a:fontRef>
+        </p:style>
+      </p:cxnSp>
+      <p:cxnSp>
+        <p:nvCxnSpPr>
+          <p:cNvPr id="13" name="Straight Arrow Connector 12"/>
+          <p:cNvCxnSpPr>
+            <a:stCxn id="3" idx="2"/>
+            <a:endCxn id="5" idx="0"/>
+          </p:cNvCxnSpPr>
+          <p:nvPr/>
+        </p:nvCxnSpPr>
+        <p:spPr>
+          <a:xfrm>
+            <a:off x="4059769" y="2743200"/>
+            <a:ext cx="0" cy="381000"/>
+          </a:xfrm>
+          <a:prstGeom prst="straightConnector1">
+            <a:avLst/>
+          </a:prstGeom>
+          <a:ln w="28575">
+            <a:solidFill>
+              <a:srgbClr val="0070C0"/>
+            </a:solidFill>
+            <a:tailEnd type="arrow"/>
+          </a:ln>
+        </p:spPr>
+        <p:style>
+          <a:lnRef idx="1">
+            <a:schemeClr val="accent1"/>
+          </a:lnRef>
+          <a:fillRef idx="0">
+            <a:schemeClr val="accent1"/>
+          </a:fillRef>
+          <a:effectRef idx="0">
+            <a:schemeClr val="accent1"/>
+          </a:effectRef>
+          <a:fontRef idx="minor">
+            <a:schemeClr val="tx1"/>
+          </a:fontRef>
+        </p:style>
+      </p:cxnSp>
+      <p:cxnSp>
+        <p:nvCxnSpPr>
+          <p:cNvPr id="16" name="Straight Arrow Connector 15"/>
+          <p:cNvCxnSpPr/>
+          <p:nvPr/>
+        </p:nvCxnSpPr>
+        <p:spPr>
+          <a:xfrm>
+            <a:off x="4707469" y="2467189"/>
+            <a:ext cx="457200" cy="0"/>
+          </a:xfrm>
+          <a:prstGeom prst="straightConnector1">
+            <a:avLst/>
+          </a:prstGeom>
+          <a:ln w="28575">
+            <a:solidFill>
+              <a:srgbClr val="0070C0"/>
+            </a:solidFill>
+            <a:tailEnd type="arrow"/>
+          </a:ln>
+        </p:spPr>
+        <p:style>
+          <a:lnRef idx="1">
+            <a:schemeClr val="accent1"/>
+          </a:lnRef>
+          <a:fillRef idx="0">
+            <a:schemeClr val="accent1"/>
+          </a:fillRef>
+          <a:effectRef idx="0">
+            <a:schemeClr val="accent1"/>
+          </a:effectRef>
+          <a:fontRef idx="minor">
+            <a:schemeClr val="tx1"/>
+          </a:fontRef>
+        </p:style>
+      </p:cxnSp>
+      <p:sp>
+        <p:nvSpPr>
+          <p:cNvPr id="29" name="Smiley Face 28"/>
+          <p:cNvSpPr/>
+          <p:nvPr/>
+        </p:nvSpPr>
+        <p:spPr>
+          <a:xfrm>
+            <a:off x="1202269" y="2743200"/>
+            <a:ext cx="381000" cy="381000"/>
+          </a:xfrm>
+          <a:prstGeom prst="smileyFace">
+            <a:avLst/>
+          </a:prstGeom>
+          <a:solidFill>
+            <a:schemeClr val="bg1"/>
+          </a:solidFill>
+          <a:ln>
+            <a:solidFill>
+              <a:schemeClr val="tx1"/>
+            </a:solidFill>
+          </a:ln>
+        </p:spPr>
+        <p:style>
+          <a:lnRef idx="2">
+            <a:schemeClr val="accent1">
+              <a:shade val="50000"/>
+            </a:schemeClr>
+          </a:lnRef>
+          <a:fillRef idx="1">
+            <a:schemeClr val="accent1"/>
+          </a:fillRef>
+          <a:effectRef idx="0">
+            <a:schemeClr val="accent1"/>
+          </a:effectRef>
+          <a:fontRef idx="minor">
+            <a:schemeClr val="lt1"/>
+          </a:fontRef>
+        </p:style>
+        <p:txBody>
+          <a:bodyPr rtlCol="0" anchor="ctr"/>
+          <a:lstStyle/>
+          <a:p>
+            <a:pPr algn="ctr"/>
+            <a:endParaRPr lang="en-US"/>
+          </a:p>
+        </p:txBody>
+      </p:sp>
+      <p:cxnSp>
+        <p:nvCxnSpPr>
+          <p:cNvPr id="32" name="Straight Arrow Connector 31"/>
+          <p:cNvCxnSpPr/>
+          <p:nvPr/>
+        </p:nvCxnSpPr>
+        <p:spPr>
+          <a:xfrm flipV="1">
+            <a:off x="1636188" y="2939996"/>
+            <a:ext cx="273050" cy="1"/>
+          </a:xfrm>
+          <a:prstGeom prst="straightConnector1">
+            <a:avLst/>
+          </a:prstGeom>
+          <a:ln w="28575">
+            <a:solidFill>
+              <a:schemeClr val="tx1"/>
+            </a:solidFill>
+            <a:prstDash val="sysDot"/>
+            <a:tailEnd type="arrow"/>
+          </a:ln>
+        </p:spPr>
+        <p:style>
+          <a:lnRef idx="1">
+            <a:schemeClr val="accent1"/>
+          </a:lnRef>
+          <a:fillRef idx="0">
+            <a:schemeClr val="accent1"/>
+          </a:fillRef>
+          <a:effectRef idx="0">
+            <a:schemeClr val="accent1"/>
+          </a:effectRef>
+          <a:fontRef idx="minor">
+            <a:schemeClr val="tx1"/>
+          </a:fontRef>
+        </p:style>
+      </p:cxnSp>
+      <p:cxnSp>
+        <p:nvCxnSpPr>
+          <p:cNvPr id="34" name="Straight Arrow Connector 33"/>
+          <p:cNvCxnSpPr/>
+          <p:nvPr/>
+        </p:nvCxnSpPr>
+        <p:spPr>
+          <a:xfrm flipV="1">
+            <a:off x="6680199" y="2467190"/>
+            <a:ext cx="939801" cy="1"/>
+          </a:xfrm>
+          <a:prstGeom prst="straightConnector1">
+            <a:avLst/>
+          </a:prstGeom>
+          <a:ln w="28575">
+            <a:solidFill>
+              <a:schemeClr val="accent6">
+                <a:lumMod val="75000"/>
+              </a:schemeClr>
+            </a:solidFill>
+            <a:prstDash val="sysDot"/>
+            <a:tailEnd type="arrow"/>
+          </a:ln>
+        </p:spPr>
+        <p:style>
+          <a:lnRef idx="1">
+            <a:schemeClr val="accent1"/>
+          </a:lnRef>
+          <a:fillRef idx="0">
+            <a:schemeClr val="accent1"/>
+          </a:fillRef>
+          <a:effectRef idx="0">
+            <a:schemeClr val="accent1"/>
+          </a:effectRef>
+          <a:fontRef idx="minor">
+            <a:schemeClr val="tx1"/>
+          </a:fontRef>
+        </p:style>
+      </p:cxnSp>
+      <p:sp>
+        <p:nvSpPr>
+          <p:cNvPr id="35" name="Folded Corner 34"/>
+          <p:cNvSpPr/>
+          <p:nvPr/>
+        </p:nvSpPr>
+        <p:spPr>
+          <a:xfrm>
+            <a:off x="7679269" y="2286000"/>
+            <a:ext cx="381000" cy="381000"/>
+          </a:xfrm>
+          <a:prstGeom prst="foldedCorner">
+            <a:avLst/>
+          </a:prstGeom>
+          <a:solidFill>
+            <a:schemeClr val="bg1"/>
+          </a:solidFill>
+          <a:ln>
+            <a:solidFill>
+              <a:schemeClr val="tx1"/>
+            </a:solidFill>
+          </a:ln>
+        </p:spPr>
+        <p:style>
+          <a:lnRef idx="2">
+            <a:schemeClr val="accent1">
+              <a:shade val="50000"/>
+            </a:schemeClr>
+          </a:lnRef>
+          <a:fillRef idx="1">
+            <a:schemeClr val="accent1"/>
+          </a:fillRef>
+          <a:effectRef idx="0">
+            <a:schemeClr val="accent1"/>
+          </a:effectRef>
+          <a:fontRef idx="minor">
+            <a:schemeClr val="lt1"/>
+          </a:fontRef>
+        </p:style>
+        <p:txBody>
+          <a:bodyPr rtlCol="0" anchor="ctr"/>
+          <a:lstStyle/>
+          <a:p>
+            <a:pPr algn="ctr"/>
+            <a:endParaRPr lang="en-US"/>
+          </a:p>
+        </p:txBody>
+      </p:sp>
+      <p:sp>
+        <p:nvSpPr>
+          <p:cNvPr id="36" name="Folded Corner 35"/>
+          <p:cNvSpPr/>
+          <p:nvPr/>
+        </p:nvSpPr>
+        <p:spPr>
+          <a:xfrm>
+            <a:off x="7772400" y="2362200"/>
+            <a:ext cx="381000" cy="381000"/>
+          </a:xfrm>
+          <a:prstGeom prst="foldedCorner">
+            <a:avLst/>
+          </a:prstGeom>
+          <a:solidFill>
+            <a:schemeClr val="bg1"/>
+          </a:solidFill>
+          <a:ln>
+            <a:solidFill>
+              <a:schemeClr val="tx1"/>
+            </a:solidFill>
+          </a:ln>
+        </p:spPr>
+        <p:style>
+          <a:lnRef idx="2">
+            <a:schemeClr val="accent1">
+              <a:shade val="50000"/>
+            </a:schemeClr>
+          </a:lnRef>
+          <a:fillRef idx="1">
+            <a:schemeClr val="accent1"/>
+          </a:fillRef>
+          <a:effectRef idx="0">
+            <a:schemeClr val="accent1"/>
+          </a:effectRef>
+          <a:fontRef idx="minor">
+            <a:schemeClr val="lt1"/>
+          </a:fontRef>
+        </p:style>
+        <p:txBody>
+          <a:bodyPr rtlCol="0" anchor="ctr"/>
+          <a:lstStyle/>
+          <a:p>
+            <a:pPr algn="ctr"/>
+            <a:endParaRPr lang="en-US"/>
+          </a:p>
+        </p:txBody>
+      </p:sp>
+      <p:sp>
+        <p:nvSpPr>
+          <p:cNvPr id="23" name="Rectangle 62"/>
+          <p:cNvSpPr/>
+          <p:nvPr/>
+        </p:nvSpPr>
+        <p:spPr>
+          <a:xfrm flipH="1">
+            <a:off x="1964269" y="3959459"/>
+            <a:ext cx="778931" cy="570908"/>
+          </a:xfrm>
+          <a:prstGeom prst="roundRect">
+            <a:avLst/>
+          </a:prstGeom>
+          <a:solidFill>
+            <a:srgbClr val="C00000"/>
+          </a:solidFill>
+          <a:ln w="19050">
+            <a:solidFill>
+              <a:srgbClr val="C00000"/>
+            </a:solidFill>
+          </a:ln>
+          <a:effectLst/>
+        </p:spPr>
+        <p:style>
+          <a:lnRef idx="1">
+            <a:schemeClr val="accent2"/>
+          </a:lnRef>
+          <a:fillRef idx="2">
+            <a:schemeClr val="accent2"/>
+          </a:fillRef>
+          <a:effectRef idx="1">
+            <a:schemeClr val="accent2"/>
+          </a:effectRef>
+          <a:fontRef idx="minor">
+            <a:schemeClr val="dk1"/>
+          </a:fontRef>
+        </p:style>
+        <p:txBody>
+          <a:bodyPr rtlCol="0" anchor="ctr"/>
+          <a:lstStyle/>
+          <a:p>
+            <a:pPr algn="ctr"/>
+            <a:r>
+              <a:rPr lang="en-US" sz="1600" dirty="0">
+                <a:solidFill>
+                  <a:schemeClr val="bg1"/>
+                </a:solidFill>
+              </a:rPr>
+              <a:t>Main</a:t>
+            </a:r>
+            <a:endParaRPr lang="en-SG" sz="1600" dirty="0">
+              <a:solidFill>
+                <a:schemeClr val="bg1"/>
+              </a:solidFill>
+            </a:endParaRPr>
+          </a:p>
+        </p:txBody>
+      </p:sp>
+      <p:cxnSp>
+        <p:nvCxnSpPr>
+          <p:cNvPr id="30" name="Straight Arrow Connector 29"/>
+          <p:cNvCxnSpPr/>
+          <p:nvPr/>
+        </p:nvCxnSpPr>
+        <p:spPr>
+          <a:xfrm>
+            <a:off x="4945047" y="3750994"/>
+            <a:ext cx="0" cy="381000"/>
+          </a:xfrm>
+          <a:prstGeom prst="straightConnector1">
+            <a:avLst/>
+          </a:prstGeom>
+          <a:ln w="28575">
+            <a:solidFill>
+              <a:schemeClr val="accent5">
+                <a:lumMod val="75000"/>
+              </a:schemeClr>
+            </a:solidFill>
+            <a:prstDash val="sysDot"/>
+            <a:tailEnd type="arrow"/>
+          </a:ln>
+        </p:spPr>
+        <p:style>
+          <a:lnRef idx="1">
+            <a:schemeClr val="accent1"/>
+          </a:lnRef>
+          <a:fillRef idx="0">
+            <a:schemeClr val="accent1"/>
+          </a:fillRef>
+          <a:effectRef idx="0">
+            <a:schemeClr val="accent1"/>
+          </a:effectRef>
+          <a:fontRef idx="minor">
+            <a:schemeClr val="tx1"/>
+          </a:fontRef>
+        </p:style>
+      </p:cxnSp>
+      <p:cxnSp>
+        <p:nvCxnSpPr>
+          <p:cNvPr id="31" name="Straight Arrow Connector 30"/>
+          <p:cNvCxnSpPr/>
+          <p:nvPr/>
+        </p:nvCxnSpPr>
+        <p:spPr>
+          <a:xfrm>
+            <a:off x="5097447" y="3761908"/>
+            <a:ext cx="0" cy="381000"/>
+          </a:xfrm>
+          <a:prstGeom prst="straightConnector1">
+            <a:avLst/>
+          </a:prstGeom>
+          <a:ln w="28575">
+            <a:solidFill>
+              <a:schemeClr val="accent5">
+                <a:lumMod val="75000"/>
+              </a:schemeClr>
+            </a:solidFill>
+            <a:prstDash val="sysDot"/>
+            <a:tailEnd type="arrow"/>
+          </a:ln>
+        </p:spPr>
+        <p:style>
+          <a:lnRef idx="1">
+            <a:schemeClr val="accent1"/>
+          </a:lnRef>
+          <a:fillRef idx="0">
+            <a:schemeClr val="accent1"/>
+          </a:fillRef>
+          <a:effectRef idx="0">
+            <a:schemeClr val="accent1"/>
+          </a:effectRef>
+          <a:fontRef idx="minor">
+            <a:schemeClr val="tx1"/>
+          </a:fontRef>
+        </p:style>
+      </p:cxnSp>
+      <p:cxnSp>
+        <p:nvCxnSpPr>
+          <p:cNvPr id="33" name="Straight Arrow Connector 32"/>
+          <p:cNvCxnSpPr/>
+          <p:nvPr/>
+        </p:nvCxnSpPr>
+        <p:spPr>
+          <a:xfrm>
+            <a:off x="5249847" y="3750994"/>
+            <a:ext cx="0" cy="381000"/>
+          </a:xfrm>
+          <a:prstGeom prst="straightConnector1">
+            <a:avLst/>
+          </a:prstGeom>
+          <a:ln w="28575">
+            <a:solidFill>
+              <a:schemeClr val="accent5">
+                <a:lumMod val="75000"/>
+              </a:schemeClr>
+            </a:solidFill>
+            <a:prstDash val="sysDot"/>
+            <a:tailEnd type="arrow"/>
+          </a:ln>
+        </p:spPr>
+        <p:style>
+          <a:lnRef idx="1">
+            <a:schemeClr val="accent1"/>
+          </a:lnRef>
+          <a:fillRef idx="0">
+            <a:schemeClr val="accent1"/>
+          </a:fillRef>
+          <a:effectRef idx="0">
+            <a:schemeClr val="accent1"/>
+          </a:effectRef>
+          <a:fontRef idx="minor">
+            <a:schemeClr val="tx1"/>
+          </a:fontRef>
+        </p:style>
+      </p:cxnSp>
+      <p:cxnSp>
+        <p:nvCxnSpPr>
+          <p:cNvPr id="37" name="Straight Arrow Connector 36"/>
+          <p:cNvCxnSpPr>
+            <a:stCxn id="23" idx="1"/>
+          </p:cNvCxnSpPr>
+          <p:nvPr/>
+        </p:nvCxnSpPr>
+        <p:spPr>
+          <a:xfrm>
+            <a:off x="2743200" y="4244913"/>
+            <a:ext cx="249770" cy="0"/>
+          </a:xfrm>
+          <a:prstGeom prst="straightConnector1">
+            <a:avLst/>
+          </a:prstGeom>
+          <a:ln w="28575">
+            <a:solidFill>
+              <a:srgbClr val="C00000"/>
+            </a:solidFill>
+            <a:prstDash val="solid"/>
+            <a:tailEnd type="arrow"/>
+          </a:ln>
+        </p:spPr>
+        <p:style>
+          <a:lnRef idx="1">
+            <a:schemeClr val="accent1"/>
+          </a:lnRef>
+          <a:fillRef idx="0">
+            <a:schemeClr val="accent1"/>
+          </a:fillRef>
+          <a:effectRef idx="0">
+            <a:schemeClr val="accent1"/>
+          </a:effectRef>
+          <a:fontRef idx="minor">
+            <a:schemeClr val="tx1"/>
+          </a:fontRef>
+        </p:style>
+      </p:cxnSp>
+      <p:cxnSp>
+        <p:nvCxnSpPr>
+          <p:cNvPr id="38" name="Straight Arrow Connector 37"/>
+          <p:cNvCxnSpPr/>
+          <p:nvPr/>
+        </p:nvCxnSpPr>
+        <p:spPr>
+          <a:xfrm rot="13867188">
+            <a:off x="2743200" y="3755022"/>
+            <a:ext cx="0" cy="381000"/>
+          </a:xfrm>
+          <a:prstGeom prst="straightConnector1">
+            <a:avLst/>
+          </a:prstGeom>
+          <a:ln w="28575">
+            <a:solidFill>
+              <a:srgbClr val="C00000"/>
+            </a:solidFill>
+            <a:prstDash val="solid"/>
+            <a:tailEnd type="arrow"/>
+          </a:ln>
+        </p:spPr>
+        <p:style>
+          <a:lnRef idx="1">
+            <a:schemeClr val="accent1"/>
+          </a:lnRef>
+          <a:fillRef idx="0">
+            <a:schemeClr val="accent1"/>
+          </a:fillRef>
+          <a:effectRef idx="0">
+            <a:schemeClr val="accent1"/>
+          </a:effectRef>
+          <a:fontRef idx="minor">
+            <a:schemeClr val="tx1"/>
+          </a:fontRef>
+        </p:style>
+      </p:cxnSp>
+      <p:cxnSp>
+        <p:nvCxnSpPr>
+          <p:cNvPr id="39" name="Straight Arrow Connector 38"/>
+          <p:cNvCxnSpPr/>
+          <p:nvPr/>
+        </p:nvCxnSpPr>
+        <p:spPr>
+          <a:xfrm flipV="1">
+            <a:off x="2353734" y="3697061"/>
+            <a:ext cx="0" cy="301859"/>
+          </a:xfrm>
+          <a:prstGeom prst="straightConnector1">
+            <a:avLst/>
+          </a:prstGeom>
+          <a:ln w="28575">
+            <a:solidFill>
+              <a:srgbClr val="C00000"/>
+            </a:solidFill>
+            <a:prstDash val="solid"/>
+            <a:tailEnd type="arrow"/>
+          </a:ln>
+        </p:spPr>
+        <p:style>
+          <a:lnRef idx="1">
+            <a:schemeClr val="accent1"/>
+          </a:lnRef>
+          <a:fillRef idx="0">
+            <a:schemeClr val="accent1"/>
+          </a:fillRef>
+          <a:effectRef idx="0">
+            <a:schemeClr val="accent1"/>
+          </a:effectRef>
+          <a:fontRef idx="minor">
+            <a:schemeClr val="tx1"/>
+          </a:fontRef>
+        </p:style>
+      </p:cxnSp>
+      <p:sp>
+        <p:nvSpPr>
+          <p:cNvPr id="6" name="Oval 5"/>
+          <p:cNvSpPr/>
+          <p:nvPr/>
+        </p:nvSpPr>
+        <p:spPr>
+          <a:xfrm>
+            <a:off x="4936069" y="2909316"/>
+            <a:ext cx="1219201" cy="533400"/>
+          </a:xfrm>
+          <a:prstGeom prst="ellipse">
+            <a:avLst/>
+          </a:prstGeom>
+          <a:solidFill>
+            <a:schemeClr val="accent5">
+              <a:lumMod val="75000"/>
+            </a:schemeClr>
+          </a:solidFill>
+          <a:ln w="19050">
+            <a:solidFill>
+              <a:schemeClr val="accent5">
+                <a:lumMod val="75000"/>
+              </a:schemeClr>
+            </a:solidFill>
+          </a:ln>
+          <a:effectLst/>
+        </p:spPr>
+        <p:style>
+          <a:lnRef idx="1">
+            <a:schemeClr val="accent5"/>
+          </a:lnRef>
+          <a:fillRef idx="2">
+            <a:schemeClr val="accent5"/>
+          </a:fillRef>
+          <a:effectRef idx="1">
+            <a:schemeClr val="accent5"/>
+          </a:effectRef>
+          <a:fontRef idx="minor">
+            <a:schemeClr val="dk1"/>
+          </a:fontRef>
+        </p:style>
+        <p:txBody>
+          <a:bodyPr rtlCol="0" anchor="ctr"/>
+          <a:lstStyle/>
+          <a:p>
+            <a:pPr algn="ctr"/>
+            <a:r>
+              <a:rPr lang="en-US" sz="1600" dirty="0">
+                <a:solidFill>
+                  <a:schemeClr val="bg1"/>
+                </a:solidFill>
+              </a:rPr>
+              <a:t>Events Center</a:t>
+            </a:r>
+          </a:p>
+        </p:txBody>
+      </p:sp>
+      <p:sp>
+        <p:nvSpPr>
+          <p:cNvPr id="26" name="Oval 25"/>
+          <p:cNvSpPr/>
+          <p:nvPr/>
+        </p:nvSpPr>
+        <p:spPr>
+          <a:xfrm>
+            <a:off x="5888569" y="3515641"/>
+            <a:ext cx="1219201" cy="533400"/>
+          </a:xfrm>
+          <a:prstGeom prst="ellipse">
+            <a:avLst/>
+          </a:prstGeom>
+          <a:solidFill>
+            <a:schemeClr val="accent5">
+              <a:lumMod val="75000"/>
+            </a:schemeClr>
+          </a:solidFill>
+          <a:ln w="19050">
+            <a:solidFill>
+              <a:schemeClr val="accent5">
+                <a:lumMod val="75000"/>
+              </a:schemeClr>
+            </a:solidFill>
+          </a:ln>
+          <a:effectLst/>
+        </p:spPr>
+        <p:style>
+          <a:lnRef idx="1">
+            <a:schemeClr val="accent5"/>
+          </a:lnRef>
+          <a:fillRef idx="2">
+            <a:schemeClr val="accent5"/>
+          </a:fillRef>
+          <a:effectRef idx="1">
+            <a:schemeClr val="accent5"/>
+          </a:effectRef>
+          <a:fontRef idx="minor">
+            <a:schemeClr val="dk1"/>
+          </a:fontRef>
+        </p:style>
+        <p:txBody>
+          <a:bodyPr rtlCol="0" anchor="ctr"/>
+          <a:lstStyle/>
+          <a:p>
+            <a:pPr algn="ctr"/>
+            <a:r>
+              <a:rPr lang="en-US" sz="1600" dirty="0">
+                <a:solidFill>
+                  <a:schemeClr val="bg1"/>
+                </a:solidFill>
+              </a:rPr>
+              <a:t>Logs</a:t>
+            </a:r>
+            <a:br>
+              <a:rPr lang="en-US" sz="1600" dirty="0">
+                <a:solidFill>
+                  <a:schemeClr val="bg1"/>
+                </a:solidFill>
+              </a:rPr>
+            </a:br>
+            <a:r>
+              <a:rPr lang="en-US" sz="1600" dirty="0">
+                <a:solidFill>
+                  <a:schemeClr val="bg1"/>
+                </a:solidFill>
+              </a:rPr>
+              <a:t>Center</a:t>
+            </a:r>
+          </a:p>
+        </p:txBody>
+      </p:sp>
+      <p:cxnSp>
+        <p:nvCxnSpPr>
+          <p:cNvPr id="40" name="Elbow Connector 39"/>
+          <p:cNvCxnSpPr>
+            <a:stCxn id="26" idx="4"/>
+            <a:endCxn id="8" idx="3"/>
+          </p:cNvCxnSpPr>
+          <p:nvPr/>
+        </p:nvCxnSpPr>
+        <p:spPr>
+          <a:xfrm rot="5400000">
+            <a:off x="6034638" y="3890781"/>
+            <a:ext cx="305273" cy="621793"/>
+          </a:xfrm>
+          <a:prstGeom prst="bentConnector2">
+            <a:avLst/>
+          </a:prstGeom>
+          <a:ln w="28575">
+            <a:solidFill>
+              <a:schemeClr val="accent5">
+                <a:lumMod val="75000"/>
+              </a:schemeClr>
+            </a:solidFill>
+          </a:ln>
+        </p:spPr>
+        <p:style>
+          <a:lnRef idx="1">
+            <a:schemeClr val="accent1"/>
+          </a:lnRef>
+          <a:fillRef idx="0">
+            <a:schemeClr val="accent1"/>
+          </a:fillRef>
+          <a:effectRef idx="0">
+            <a:schemeClr val="accent1"/>
+          </a:effectRef>
+          <a:fontRef idx="minor">
+            <a:schemeClr val="tx1"/>
+          </a:fontRef>
+        </p:style>
+      </p:cxnSp>
+      <p:cxnSp>
+        <p:nvCxnSpPr>
+          <p:cNvPr id="9" name="Elbow Connector 8"/>
+          <p:cNvCxnSpPr>
+            <a:stCxn id="6" idx="4"/>
+          </p:cNvCxnSpPr>
+          <p:nvPr/>
+        </p:nvCxnSpPr>
+        <p:spPr>
+          <a:xfrm rot="5400000">
+            <a:off x="5195574" y="3792812"/>
+            <a:ext cx="700192" cy="1"/>
+          </a:xfrm>
+          <a:prstGeom prst="bentConnector3">
+            <a:avLst/>
+          </a:prstGeom>
+          <a:ln w="28575">
+            <a:solidFill>
+              <a:schemeClr val="accent5">
+                <a:lumMod val="75000"/>
+              </a:schemeClr>
+            </a:solidFill>
+          </a:ln>
+        </p:spPr>
+        <p:style>
+          <a:lnRef idx="1">
+            <a:schemeClr val="accent1"/>
+          </a:lnRef>
+          <a:fillRef idx="0">
+            <a:schemeClr val="accent1"/>
+          </a:fillRef>
+          <a:effectRef idx="0">
+            <a:schemeClr val="accent1"/>
+          </a:effectRef>
+          <a:fontRef idx="minor">
+            <a:schemeClr val="tx1"/>
+          </a:fontRef>
+        </p:style>
+      </p:cxnSp>
+    </p:spTree>
+    <p:extLst>
+      <p:ext uri="{BB962C8B-B14F-4D97-AF65-F5344CB8AC3E}">
+        <p14:creationId xmlns:p14="http://schemas.microsoft.com/office/powerpoint/2010/main" val="2698971452"/>
       </p:ext>
     </p:extLst>
   </p:cSld>

</xml_diff>